<commit_message>
More slides added to ppt
</commit_message>
<xml_diff>
--- a/workshop/CypressWS.pptx
+++ b/workshop/CypressWS.pptx
@@ -5,7 +5,7 @@
     <p:sldMasterId id="2147483648" r:id="rId1"/>
   </p:sldMasterIdLst>
   <p:notesMasterIdLst>
-    <p:notesMasterId r:id="rId8"/>
+    <p:notesMasterId r:id="rId10"/>
   </p:notesMasterIdLst>
   <p:sldIdLst>
     <p:sldId id="256" r:id="rId2"/>
@@ -14,6 +14,8 @@
     <p:sldId id="368" r:id="rId5"/>
     <p:sldId id="369" r:id="rId6"/>
     <p:sldId id="370" r:id="rId7"/>
+    <p:sldId id="371" r:id="rId8"/>
+    <p:sldId id="372" r:id="rId9"/>
   </p:sldIdLst>
   <p:sldSz cx="9144000" cy="6858000" type="screen4x3"/>
   <p:notesSz cx="6797675" cy="9926638"/>
@@ -214,7 +216,7 @@
             <a:fld id="{4B692815-F29B-470E-933C-C013C16C0B4A}" type="datetimeFigureOut">
               <a:rPr lang="sv-SE" smtClean="0"/>
               <a:pPr/>
-              <a:t>2021-09-15</a:t>
+              <a:t>2021-09-16</a:t>
             </a:fld>
             <a:endParaRPr lang="sv-SE"/>
           </a:p>
@@ -1020,7 +1022,7 @@
             </a:pPr>
             <a:r>
               <a:rPr lang="en-US" noProof="0" dirty="0"/>
-              <a:t>I’ve googled some of the pros and cons of Cypress and Selenium, and come up with this table.</a:t>
+              <a:t>I’ve googled some of the pros and cons of Cypress and Selenium and came up with this table.</a:t>
             </a:r>
           </a:p>
           <a:p>
@@ -1180,6 +1182,292 @@
     <p:extLst>
       <p:ext uri="{BB962C8B-B14F-4D97-AF65-F5344CB8AC3E}">
         <p14:creationId xmlns:p14="http://schemas.microsoft.com/office/powerpoint/2010/main" val="1074161473"/>
+      </p:ext>
+    </p:extLst>
+  </p:cSld>
+  <p:clrMapOvr>
+    <a:masterClrMapping/>
+  </p:clrMapOvr>
+</p:notes>
+</file>
+
+<file path=ppt/notesSlides/notesSlide6.xml><?xml version="1.0" encoding="utf-8"?>
+<p:notes xmlns:a="http://schemas.openxmlformats.org/drawingml/2006/main" xmlns:r="http://schemas.openxmlformats.org/officeDocument/2006/relationships" xmlns:p="http://schemas.openxmlformats.org/presentationml/2006/main" showMasterSp="0" showMasterPhAnim="0">
+  <p:cSld>
+    <p:spTree>
+      <p:nvGrpSpPr>
+        <p:cNvPr id="1" name="Shape 33"/>
+        <p:cNvGrpSpPr/>
+        <p:nvPr/>
+      </p:nvGrpSpPr>
+      <p:grpSpPr>
+        <a:xfrm>
+          <a:off x="0" y="0"/>
+          <a:ext cx="0" cy="0"/>
+          <a:chOff x="0" y="0"/>
+          <a:chExt cx="0" cy="0"/>
+        </a:xfrm>
+      </p:grpSpPr>
+      <p:sp>
+        <p:nvSpPr>
+          <p:cNvPr id="34" name="Shape 34"/>
+          <p:cNvSpPr>
+            <a:spLocks noGrp="1" noRot="1" noChangeAspect="1"/>
+          </p:cNvSpPr>
+          <p:nvPr>
+            <p:ph type="sldImg" idx="2"/>
+          </p:nvPr>
+        </p:nvSpPr>
+        <p:spPr>
+          <a:xfrm>
+            <a:off x="919163" y="744538"/>
+            <a:ext cx="4960937" cy="3722687"/>
+          </a:xfrm>
+          <a:custGeom>
+            <a:avLst/>
+            <a:gdLst/>
+            <a:ahLst/>
+            <a:cxnLst/>
+            <a:rect l="0" t="0" r="0" b="0"/>
+            <a:pathLst>
+              <a:path w="120000" h="120000" extrusionOk="0">
+                <a:moveTo>
+                  <a:pt x="0" y="0"/>
+                </a:moveTo>
+                <a:lnTo>
+                  <a:pt x="120000" y="0"/>
+                </a:lnTo>
+                <a:lnTo>
+                  <a:pt x="120000" y="120000"/>
+                </a:lnTo>
+                <a:lnTo>
+                  <a:pt x="0" y="120000"/>
+                </a:lnTo>
+                <a:close/>
+              </a:path>
+            </a:pathLst>
+          </a:custGeom>
+        </p:spPr>
+      </p:sp>
+      <p:sp>
+        <p:nvSpPr>
+          <p:cNvPr id="35" name="Shape 35"/>
+          <p:cNvSpPr txBox="1">
+            <a:spLocks noGrp="1"/>
+          </p:cNvSpPr>
+          <p:nvPr>
+            <p:ph type="body" idx="1"/>
+          </p:nvPr>
+        </p:nvSpPr>
+        <p:spPr>
+          <a:xfrm>
+            <a:off x="679768" y="4715153"/>
+            <a:ext cx="5438139" cy="4466987"/>
+          </a:xfrm>
+          <a:prstGeom prst="rect">
+            <a:avLst/>
+          </a:prstGeom>
+        </p:spPr>
+        <p:txBody>
+          <a:bodyPr lIns="91425" tIns="91425" rIns="91425" bIns="91425" anchor="t" anchorCtr="0">
+            <a:noAutofit/>
+          </a:bodyPr>
+          <a:lstStyle/>
+          <a:p>
+            <a:pPr marL="171450" indent="-171450">
+              <a:buFontTx/>
+              <a:buChar char="-"/>
+            </a:pPr>
+            <a:r>
+              <a:rPr lang="en-US" noProof="0" dirty="0"/>
+              <a:t>Show where example tests are located, open todo.js and show the structure of the test-spec</a:t>
+            </a:r>
+          </a:p>
+          <a:p>
+            <a:pPr marL="171450" indent="-171450">
+              <a:buFontTx/>
+              <a:buChar char="-"/>
+            </a:pPr>
+            <a:r>
+              <a:rPr lang="en-US" noProof="0" dirty="0"/>
+              <a:t>Go thru the key-words</a:t>
+            </a:r>
+          </a:p>
+          <a:p>
+            <a:pPr marL="171450" indent="-171450">
+              <a:buFontTx/>
+              <a:buChar char="-"/>
+            </a:pPr>
+            <a:r>
+              <a:rPr lang="en-US" noProof="0" dirty="0"/>
+              <a:t>Show the example testcase again and walk thru it</a:t>
+            </a:r>
+          </a:p>
+          <a:p>
+            <a:pPr marL="0" indent="0">
+              <a:buFontTx/>
+              <a:buNone/>
+            </a:pPr>
+            <a:r>
+              <a:rPr lang="en-US" noProof="0" dirty="0"/>
+              <a:t>	Mention nested calls.</a:t>
+            </a:r>
+          </a:p>
+          <a:p>
+            <a:pPr marL="171450" indent="-171450">
+              <a:buFontTx/>
+              <a:buChar char="-"/>
+            </a:pPr>
+            <a:endParaRPr lang="en-US" noProof="0" dirty="0"/>
+          </a:p>
+        </p:txBody>
+      </p:sp>
+    </p:spTree>
+    <p:extLst>
+      <p:ext uri="{BB962C8B-B14F-4D97-AF65-F5344CB8AC3E}">
+        <p14:creationId xmlns:p14="http://schemas.microsoft.com/office/powerpoint/2010/main" val="824181124"/>
+      </p:ext>
+    </p:extLst>
+  </p:cSld>
+  <p:clrMapOvr>
+    <a:masterClrMapping/>
+  </p:clrMapOvr>
+</p:notes>
+</file>
+
+<file path=ppt/notesSlides/notesSlide7.xml><?xml version="1.0" encoding="utf-8"?>
+<p:notes xmlns:a="http://schemas.openxmlformats.org/drawingml/2006/main" xmlns:r="http://schemas.openxmlformats.org/officeDocument/2006/relationships" xmlns:p="http://schemas.openxmlformats.org/presentationml/2006/main" showMasterSp="0" showMasterPhAnim="0">
+  <p:cSld>
+    <p:spTree>
+      <p:nvGrpSpPr>
+        <p:cNvPr id="1" name="Shape 33"/>
+        <p:cNvGrpSpPr/>
+        <p:nvPr/>
+      </p:nvGrpSpPr>
+      <p:grpSpPr>
+        <a:xfrm>
+          <a:off x="0" y="0"/>
+          <a:ext cx="0" cy="0"/>
+          <a:chOff x="0" y="0"/>
+          <a:chExt cx="0" cy="0"/>
+        </a:xfrm>
+      </p:grpSpPr>
+      <p:sp>
+        <p:nvSpPr>
+          <p:cNvPr id="34" name="Shape 34"/>
+          <p:cNvSpPr>
+            <a:spLocks noGrp="1" noRot="1" noChangeAspect="1"/>
+          </p:cNvSpPr>
+          <p:nvPr>
+            <p:ph type="sldImg" idx="2"/>
+          </p:nvPr>
+        </p:nvSpPr>
+        <p:spPr>
+          <a:xfrm>
+            <a:off x="919163" y="744538"/>
+            <a:ext cx="4960937" cy="3722687"/>
+          </a:xfrm>
+          <a:custGeom>
+            <a:avLst/>
+            <a:gdLst/>
+            <a:ahLst/>
+            <a:cxnLst/>
+            <a:rect l="0" t="0" r="0" b="0"/>
+            <a:pathLst>
+              <a:path w="120000" h="120000" extrusionOk="0">
+                <a:moveTo>
+                  <a:pt x="0" y="0"/>
+                </a:moveTo>
+                <a:lnTo>
+                  <a:pt x="120000" y="0"/>
+                </a:lnTo>
+                <a:lnTo>
+                  <a:pt x="120000" y="120000"/>
+                </a:lnTo>
+                <a:lnTo>
+                  <a:pt x="0" y="120000"/>
+                </a:lnTo>
+                <a:close/>
+              </a:path>
+            </a:pathLst>
+          </a:custGeom>
+        </p:spPr>
+      </p:sp>
+      <p:sp>
+        <p:nvSpPr>
+          <p:cNvPr id="35" name="Shape 35"/>
+          <p:cNvSpPr txBox="1">
+            <a:spLocks noGrp="1"/>
+          </p:cNvSpPr>
+          <p:nvPr>
+            <p:ph type="body" idx="1"/>
+          </p:nvPr>
+        </p:nvSpPr>
+        <p:spPr>
+          <a:xfrm>
+            <a:off x="679768" y="4715153"/>
+            <a:ext cx="5438139" cy="4466987"/>
+          </a:xfrm>
+          <a:prstGeom prst="rect">
+            <a:avLst/>
+          </a:prstGeom>
+        </p:spPr>
+        <p:txBody>
+          <a:bodyPr lIns="91425" tIns="91425" rIns="91425" bIns="91425" anchor="t" anchorCtr="0">
+            <a:noAutofit/>
+          </a:bodyPr>
+          <a:lstStyle/>
+          <a:p>
+            <a:pPr marL="171450" indent="-171450">
+              <a:buFontTx/>
+              <a:buChar char="-"/>
+            </a:pPr>
+            <a:r>
+              <a:rPr lang="en-US" noProof="0" dirty="0"/>
+              <a:t>Explain the 3 </a:t>
+            </a:r>
+            <a:r>
+              <a:rPr lang="en-US" noProof="0" dirty="0" err="1"/>
+              <a:t>cmd’s</a:t>
+            </a:r>
+            <a:endParaRPr lang="en-US" noProof="0" dirty="0"/>
+          </a:p>
+          <a:p>
+            <a:pPr marL="171450" marR="0" lvl="0" indent="-171450" algn="l" defTabSz="914400" rtl="0" eaLnBrk="1" fontAlgn="auto" latinLnBrk="0" hangingPunct="1">
+              <a:lnSpc>
+                <a:spcPct val="100000"/>
+              </a:lnSpc>
+              <a:spcBef>
+                <a:spcPts val="0"/>
+              </a:spcBef>
+              <a:spcAft>
+                <a:spcPts val="0"/>
+              </a:spcAft>
+              <a:buClrTx/>
+              <a:buSzTx/>
+              <a:buFontTx/>
+              <a:buChar char="-"/>
+              <a:tabLst/>
+              <a:defRPr/>
+            </a:pPr>
+            <a:r>
+              <a:rPr lang="en-US" noProof="0"/>
+              <a:t>Start cypress and run the example</a:t>
+            </a:r>
+          </a:p>
+          <a:p>
+            <a:pPr marL="171450" indent="-171450">
+              <a:buFontTx/>
+              <a:buChar char="-"/>
+            </a:pPr>
+            <a:endParaRPr lang="en-US" noProof="0" dirty="0"/>
+          </a:p>
+        </p:txBody>
+      </p:sp>
+    </p:spTree>
+    <p:extLst>
+      <p:ext uri="{BB962C8B-B14F-4D97-AF65-F5344CB8AC3E}">
+        <p14:creationId xmlns:p14="http://schemas.microsoft.com/office/powerpoint/2010/main" val="1037409139"/>
       </p:ext>
     </p:extLst>
   </p:cSld>
@@ -6590,7 +6878,7 @@
           <p:nvPr>
             <p:extLst>
               <p:ext uri="{D42A27DB-BD31-4B8C-83A1-F6EECF244321}">
-                <p14:modId xmlns:p14="http://schemas.microsoft.com/office/powerpoint/2010/main" val="3379203636"/>
+                <p14:modId xmlns:p14="http://schemas.microsoft.com/office/powerpoint/2010/main" val="1258711636"/>
               </p:ext>
             </p:extLst>
           </p:nvPr>
@@ -6824,6 +7112,20 @@
                         <a:t>Provides Concise APIs</a:t>
                       </a:r>
                     </a:p>
+                    <a:p>
+                      <a:r>
+                        <a:rPr lang="en-US" sz="1800" b="0" i="0" kern="1200" dirty="0">
+                          <a:solidFill>
+                            <a:schemeClr val="dk1"/>
+                          </a:solidFill>
+                          <a:effectLst/>
+                          <a:latin typeface="+mn-lt"/>
+                          <a:ea typeface="+mn-ea"/>
+                          <a:cs typeface="+mn-cs"/>
+                        </a:rPr>
+                        <a:t>Multiple tests possible</a:t>
+                      </a:r>
+                    </a:p>
                   </a:txBody>
                   <a:tcPr/>
                 </a:tc>
@@ -7320,6 +7622,829 @@
     <p:extLst>
       <p:ext uri="{BB962C8B-B14F-4D97-AF65-F5344CB8AC3E}">
         <p14:creationId xmlns:p14="http://schemas.microsoft.com/office/powerpoint/2010/main" val="3100867012"/>
+      </p:ext>
+    </p:extLst>
+  </p:cSld>
+  <p:clrMapOvr>
+    <a:masterClrMapping/>
+  </p:clrMapOvr>
+  <p:transition spd="slow">
+    <p:cut/>
+  </p:transition>
+</p:sld>
+</file>
+
+<file path=ppt/slides/slide7.xml><?xml version="1.0" encoding="utf-8"?>
+<p:sld xmlns:a="http://schemas.openxmlformats.org/drawingml/2006/main" xmlns:r="http://schemas.openxmlformats.org/officeDocument/2006/relationships" xmlns:p="http://schemas.openxmlformats.org/presentationml/2006/main">
+  <p:cSld>
+    <p:spTree>
+      <p:nvGrpSpPr>
+        <p:cNvPr id="1" name="Shape 29"/>
+        <p:cNvGrpSpPr/>
+        <p:nvPr/>
+      </p:nvGrpSpPr>
+      <p:grpSpPr>
+        <a:xfrm>
+          <a:off x="0" y="0"/>
+          <a:ext cx="0" cy="0"/>
+          <a:chOff x="0" y="0"/>
+          <a:chExt cx="0" cy="0"/>
+        </a:xfrm>
+      </p:grpSpPr>
+      <p:sp>
+        <p:nvSpPr>
+          <p:cNvPr id="30" name="Shape 30"/>
+          <p:cNvSpPr txBox="1">
+            <a:spLocks noGrp="1"/>
+          </p:cNvSpPr>
+          <p:nvPr>
+            <p:ph type="title"/>
+          </p:nvPr>
+        </p:nvSpPr>
+        <p:spPr>
+          <a:xfrm>
+            <a:off x="457200" y="380331"/>
+            <a:ext cx="8229600" cy="782960"/>
+          </a:xfrm>
+          <a:prstGeom prst="rect">
+            <a:avLst/>
+          </a:prstGeom>
+        </p:spPr>
+        <p:txBody>
+          <a:bodyPr lIns="91425" tIns="91425" rIns="91425" bIns="91425" anchor="b" anchorCtr="0">
+            <a:noAutofit/>
+          </a:bodyPr>
+          <a:lstStyle/>
+          <a:p>
+            <a:r>
+              <a:rPr lang="en-US" sz="3600" dirty="0"/>
+              <a:t>First test</a:t>
+            </a:r>
+            <a:endParaRPr lang="sv" dirty="0"/>
+          </a:p>
+        </p:txBody>
+      </p:sp>
+      <p:sp>
+        <p:nvSpPr>
+          <p:cNvPr id="31" name="Shape 31"/>
+          <p:cNvSpPr txBox="1">
+            <a:spLocks noGrp="1"/>
+          </p:cNvSpPr>
+          <p:nvPr>
+            <p:ph type="body" idx="1"/>
+          </p:nvPr>
+        </p:nvSpPr>
+        <p:spPr>
+          <a:xfrm>
+            <a:off x="457200" y="1290464"/>
+            <a:ext cx="8229600" cy="4277072"/>
+          </a:xfrm>
+          <a:prstGeom prst="rect">
+            <a:avLst/>
+          </a:prstGeom>
+        </p:spPr>
+        <p:txBody>
+          <a:bodyPr lIns="91425" tIns="91425" rIns="91425" bIns="91425" anchor="t" anchorCtr="0">
+            <a:noAutofit/>
+          </a:bodyPr>
+          <a:lstStyle/>
+          <a:p>
+            <a:pPr marL="457200" lvl="0" indent="-381000">
+              <a:lnSpc>
+                <a:spcPct val="115000"/>
+              </a:lnSpc>
+              <a:spcBef>
+                <a:spcPts val="0"/>
+              </a:spcBef>
+              <a:buClr>
+                <a:srgbClr val="000000"/>
+              </a:buClr>
+              <a:buSzPct val="166666"/>
+              <a:buFont typeface="Arial"/>
+              <a:buChar char="•"/>
+            </a:pPr>
+            <a:r>
+              <a:rPr lang="en-US" sz="2400" dirty="0"/>
+              <a:t>Cypress come with a bundle of example tests</a:t>
+            </a:r>
+          </a:p>
+          <a:p>
+            <a:pPr marL="857250" lvl="1" indent="-381000">
+              <a:lnSpc>
+                <a:spcPct val="115000"/>
+              </a:lnSpc>
+              <a:spcBef>
+                <a:spcPts val="0"/>
+              </a:spcBef>
+              <a:buClr>
+                <a:srgbClr val="000000"/>
+              </a:buClr>
+              <a:buSzPct val="166666"/>
+              <a:buFont typeface="Arial"/>
+              <a:buChar char="•"/>
+            </a:pPr>
+            <a:r>
+              <a:rPr lang="en-US" sz="2300" dirty="0"/>
+              <a:t>By default, all tests are located in /cypress/integration</a:t>
+            </a:r>
+          </a:p>
+          <a:p>
+            <a:pPr marL="457200" indent="-381000">
+              <a:lnSpc>
+                <a:spcPct val="115000"/>
+              </a:lnSpc>
+              <a:spcBef>
+                <a:spcPts val="0"/>
+              </a:spcBef>
+              <a:buClr>
+                <a:srgbClr val="000000"/>
+              </a:buClr>
+              <a:buSzPct val="166666"/>
+              <a:buFont typeface="Arial"/>
+              <a:buChar char="•"/>
+            </a:pPr>
+            <a:r>
+              <a:rPr lang="en-US" dirty="0"/>
+              <a:t>Mocha test structure</a:t>
+            </a:r>
+          </a:p>
+          <a:p>
+            <a:pPr marL="76200" lvl="0" indent="0">
+              <a:lnSpc>
+                <a:spcPct val="115000"/>
+              </a:lnSpc>
+              <a:spcBef>
+                <a:spcPts val="0"/>
+              </a:spcBef>
+              <a:buClr>
+                <a:srgbClr val="000000"/>
+              </a:buClr>
+              <a:buSzPct val="166666"/>
+              <a:buNone/>
+            </a:pPr>
+            <a:endParaRPr lang="en-US" sz="2400" dirty="0"/>
+          </a:p>
+          <a:p>
+            <a:pPr marL="76200" lvl="0" indent="0">
+              <a:lnSpc>
+                <a:spcPct val="115000"/>
+              </a:lnSpc>
+              <a:spcBef>
+                <a:spcPts val="0"/>
+              </a:spcBef>
+              <a:buClr>
+                <a:srgbClr val="000000"/>
+              </a:buClr>
+              <a:buSzPct val="166666"/>
+              <a:buNone/>
+            </a:pPr>
+            <a:endParaRPr lang="en-US" sz="2400" dirty="0"/>
+          </a:p>
+          <a:p>
+            <a:pPr marL="457200" lvl="0" indent="-381000">
+              <a:lnSpc>
+                <a:spcPct val="115000"/>
+              </a:lnSpc>
+              <a:spcBef>
+                <a:spcPts val="0"/>
+              </a:spcBef>
+              <a:buClr>
+                <a:srgbClr val="000000"/>
+              </a:buClr>
+              <a:buSzPct val="166666"/>
+              <a:buFont typeface="Arial"/>
+              <a:buChar char="•"/>
+            </a:pPr>
+            <a:endParaRPr lang="sv" sz="2400" dirty="0"/>
+          </a:p>
+          <a:p>
+            <a:pPr marL="76200" lvl="0" indent="0">
+              <a:lnSpc>
+                <a:spcPct val="115000"/>
+              </a:lnSpc>
+              <a:spcBef>
+                <a:spcPts val="0"/>
+              </a:spcBef>
+              <a:buClr>
+                <a:srgbClr val="000000"/>
+              </a:buClr>
+              <a:buSzPct val="166666"/>
+              <a:buNone/>
+            </a:pPr>
+            <a:endParaRPr lang="sv" sz="2400" dirty="0">
+              <a:solidFill>
+                <a:srgbClr val="000000"/>
+              </a:solidFill>
+            </a:endParaRPr>
+          </a:p>
+          <a:p>
+            <a:pPr marL="476250" lvl="1" indent="0">
+              <a:lnSpc>
+                <a:spcPct val="115000"/>
+              </a:lnSpc>
+              <a:spcBef>
+                <a:spcPts val="0"/>
+              </a:spcBef>
+              <a:buClr>
+                <a:srgbClr val="000000"/>
+              </a:buClr>
+              <a:buSzPct val="166666"/>
+              <a:buNone/>
+            </a:pPr>
+            <a:endParaRPr lang="sv" sz="2300" dirty="0">
+              <a:solidFill>
+                <a:srgbClr val="000000"/>
+              </a:solidFill>
+            </a:endParaRPr>
+          </a:p>
+          <a:p>
+            <a:pPr marL="476250" lvl="1" indent="0">
+              <a:lnSpc>
+                <a:spcPct val="115000"/>
+              </a:lnSpc>
+              <a:spcBef>
+                <a:spcPts val="0"/>
+              </a:spcBef>
+              <a:buClr>
+                <a:srgbClr val="000000"/>
+              </a:buClr>
+              <a:buSzPct val="166666"/>
+              <a:buNone/>
+            </a:pPr>
+            <a:endParaRPr lang="sv" sz="2300" dirty="0">
+              <a:solidFill>
+                <a:srgbClr val="000000"/>
+              </a:solidFill>
+            </a:endParaRPr>
+          </a:p>
+          <a:p>
+            <a:pPr marL="476250" lvl="1" indent="0">
+              <a:lnSpc>
+                <a:spcPct val="115000"/>
+              </a:lnSpc>
+              <a:spcBef>
+                <a:spcPts val="0"/>
+              </a:spcBef>
+              <a:buClr>
+                <a:srgbClr val="000000"/>
+              </a:buClr>
+              <a:buSzPct val="166666"/>
+              <a:buNone/>
+            </a:pPr>
+            <a:endParaRPr lang="sv" sz="2300" dirty="0">
+              <a:solidFill>
+                <a:srgbClr val="000000"/>
+              </a:solidFill>
+            </a:endParaRPr>
+          </a:p>
+          <a:p>
+            <a:pPr marL="0" indent="0">
+              <a:buNone/>
+            </a:pPr>
+            <a:endParaRPr lang="sv" sz="2400" dirty="0">
+              <a:solidFill>
+                <a:srgbClr val="000000"/>
+              </a:solidFill>
+            </a:endParaRPr>
+          </a:p>
+        </p:txBody>
+      </p:sp>
+      <p:graphicFrame>
+        <p:nvGraphicFramePr>
+          <p:cNvPr id="2" name="Table 2">
+            <a:extLst>
+              <a:ext uri="{FF2B5EF4-FFF2-40B4-BE49-F238E27FC236}">
+                <a16:creationId xmlns:a16="http://schemas.microsoft.com/office/drawing/2014/main" id="{5B2188FC-3518-48DE-A7E4-A383D145EB54}"/>
+              </a:ext>
+            </a:extLst>
+          </p:cNvPr>
+          <p:cNvGraphicFramePr>
+            <a:graphicFrameLocks noGrp="1"/>
+          </p:cNvGraphicFramePr>
+          <p:nvPr>
+            <p:extLst>
+              <p:ext uri="{D42A27DB-BD31-4B8C-83A1-F6EECF244321}">
+                <p14:modId xmlns:p14="http://schemas.microsoft.com/office/powerpoint/2010/main" val="2862056461"/>
+              </p:ext>
+            </p:extLst>
+          </p:nvPr>
+        </p:nvGraphicFramePr>
+        <p:xfrm>
+          <a:off x="611560" y="2708920"/>
+          <a:ext cx="7560840" cy="3235960"/>
+        </p:xfrm>
+        <a:graphic>
+          <a:graphicData uri="http://schemas.openxmlformats.org/drawingml/2006/table">
+            <a:tbl>
+              <a:tblPr firstRow="1" bandRow="1">
+                <a:tableStyleId>{5C22544A-7EE6-4342-B048-85BDC9FD1C3A}</a:tableStyleId>
+              </a:tblPr>
+              <a:tblGrid>
+                <a:gridCol w="2088232">
+                  <a:extLst>
+                    <a:ext uri="{9D8B030D-6E8A-4147-A177-3AD203B41FA5}">
+                      <a16:colId xmlns:a16="http://schemas.microsoft.com/office/drawing/2014/main" val="275557153"/>
+                    </a:ext>
+                  </a:extLst>
+                </a:gridCol>
+                <a:gridCol w="5472608">
+                  <a:extLst>
+                    <a:ext uri="{9D8B030D-6E8A-4147-A177-3AD203B41FA5}">
+                      <a16:colId xmlns:a16="http://schemas.microsoft.com/office/drawing/2014/main" val="3071893912"/>
+                    </a:ext>
+                  </a:extLst>
+                </a:gridCol>
+              </a:tblGrid>
+              <a:tr h="370840">
+                <a:tc>
+                  <a:txBody>
+                    <a:bodyPr/>
+                    <a:lstStyle/>
+                    <a:p>
+                      <a:r>
+                        <a:rPr lang="en-US" dirty="0"/>
+                        <a:t>Key functions </a:t>
+                      </a:r>
+                    </a:p>
+                  </a:txBody>
+                  <a:tcPr/>
+                </a:tc>
+                <a:tc>
+                  <a:txBody>
+                    <a:bodyPr/>
+                    <a:lstStyle/>
+                    <a:p>
+                      <a:r>
+                        <a:rPr lang="en-US" dirty="0"/>
+                        <a:t>Meaning/Use</a:t>
+                      </a:r>
+                    </a:p>
+                  </a:txBody>
+                  <a:tcPr/>
+                </a:tc>
+                <a:extLst>
+                  <a:ext uri="{0D108BD9-81ED-4DB2-BD59-A6C34878D82A}">
+                    <a16:rowId xmlns:a16="http://schemas.microsoft.com/office/drawing/2014/main" val="2363642929"/>
+                  </a:ext>
+                </a:extLst>
+              </a:tr>
+              <a:tr h="370840">
+                <a:tc>
+                  <a:txBody>
+                    <a:bodyPr/>
+                    <a:lstStyle/>
+                    <a:p>
+                      <a:r>
+                        <a:rPr lang="en-US" dirty="0"/>
+                        <a:t>describe()</a:t>
+                      </a:r>
+                    </a:p>
+                  </a:txBody>
+                  <a:tcPr/>
+                </a:tc>
+                <a:tc>
+                  <a:txBody>
+                    <a:bodyPr/>
+                    <a:lstStyle/>
+                    <a:p>
+                      <a:r>
+                        <a:rPr lang="en-US" dirty="0"/>
+                        <a:t>Test suite, organize a set of test for one subject.</a:t>
+                      </a:r>
+                    </a:p>
+                  </a:txBody>
+                  <a:tcPr/>
+                </a:tc>
+                <a:extLst>
+                  <a:ext uri="{0D108BD9-81ED-4DB2-BD59-A6C34878D82A}">
+                    <a16:rowId xmlns:a16="http://schemas.microsoft.com/office/drawing/2014/main" val="779011282"/>
+                  </a:ext>
+                </a:extLst>
+              </a:tr>
+              <a:tr h="370840">
+                <a:tc>
+                  <a:txBody>
+                    <a:bodyPr/>
+                    <a:lstStyle/>
+                    <a:p>
+                      <a:r>
+                        <a:rPr lang="en-US" dirty="0"/>
+                        <a:t>context()</a:t>
+                      </a:r>
+                    </a:p>
+                  </a:txBody>
+                  <a:tcPr/>
+                </a:tc>
+                <a:tc>
+                  <a:txBody>
+                    <a:bodyPr/>
+                    <a:lstStyle/>
+                    <a:p>
+                      <a:r>
+                        <a:rPr lang="en-US" dirty="0"/>
+                        <a:t>Same functionality as ‘describe’. Often used when a subject is in a specific state. Enhances readability.</a:t>
+                      </a:r>
+                    </a:p>
+                  </a:txBody>
+                  <a:tcPr/>
+                </a:tc>
+                <a:extLst>
+                  <a:ext uri="{0D108BD9-81ED-4DB2-BD59-A6C34878D82A}">
+                    <a16:rowId xmlns:a16="http://schemas.microsoft.com/office/drawing/2014/main" val="1112442075"/>
+                  </a:ext>
+                </a:extLst>
+              </a:tr>
+              <a:tr h="370840">
+                <a:tc>
+                  <a:txBody>
+                    <a:bodyPr/>
+                    <a:lstStyle/>
+                    <a:p>
+                      <a:r>
+                        <a:rPr lang="en-US" dirty="0"/>
+                        <a:t>it()</a:t>
+                      </a:r>
+                    </a:p>
+                  </a:txBody>
+                  <a:tcPr/>
+                </a:tc>
+                <a:tc>
+                  <a:txBody>
+                    <a:bodyPr/>
+                    <a:lstStyle/>
+                    <a:p>
+                      <a:r>
+                        <a:rPr lang="en-US" dirty="0"/>
+                        <a:t>Test case. This is where the actual test code goes.</a:t>
+                      </a:r>
+                    </a:p>
+                  </a:txBody>
+                  <a:tcPr/>
+                </a:tc>
+                <a:extLst>
+                  <a:ext uri="{0D108BD9-81ED-4DB2-BD59-A6C34878D82A}">
+                    <a16:rowId xmlns:a16="http://schemas.microsoft.com/office/drawing/2014/main" val="680418926"/>
+                  </a:ext>
+                </a:extLst>
+              </a:tr>
+              <a:tr h="370840">
+                <a:tc>
+                  <a:txBody>
+                    <a:bodyPr/>
+                    <a:lstStyle/>
+                    <a:p>
+                      <a:r>
+                        <a:rPr lang="en-US" dirty="0" err="1"/>
+                        <a:t>beforeEach</a:t>
+                      </a:r>
+                      <a:r>
+                        <a:rPr lang="en-US" dirty="0"/>
+                        <a:t>()</a:t>
+                      </a:r>
+                    </a:p>
+                  </a:txBody>
+                  <a:tcPr/>
+                </a:tc>
+                <a:tc>
+                  <a:txBody>
+                    <a:bodyPr/>
+                    <a:lstStyle/>
+                    <a:p>
+                      <a:r>
+                        <a:rPr lang="en-US" dirty="0"/>
+                        <a:t>Code that will run before each test case.</a:t>
+                      </a:r>
+                    </a:p>
+                  </a:txBody>
+                  <a:tcPr/>
+                </a:tc>
+                <a:extLst>
+                  <a:ext uri="{0D108BD9-81ED-4DB2-BD59-A6C34878D82A}">
+                    <a16:rowId xmlns:a16="http://schemas.microsoft.com/office/drawing/2014/main" val="2456862409"/>
+                  </a:ext>
+                </a:extLst>
+              </a:tr>
+              <a:tr h="370840">
+                <a:tc>
+                  <a:txBody>
+                    <a:bodyPr/>
+                    <a:lstStyle/>
+                    <a:p>
+                      <a:r>
+                        <a:rPr lang="en-US" dirty="0"/>
+                        <a:t>before()</a:t>
+                      </a:r>
+                    </a:p>
+                  </a:txBody>
+                  <a:tcPr/>
+                </a:tc>
+                <a:tc>
+                  <a:txBody>
+                    <a:bodyPr/>
+                    <a:lstStyle/>
+                    <a:p>
+                      <a:r>
+                        <a:rPr lang="en-US" dirty="0"/>
+                        <a:t>Code that will run once before any test case is run.</a:t>
+                      </a:r>
+                    </a:p>
+                  </a:txBody>
+                  <a:tcPr/>
+                </a:tc>
+                <a:extLst>
+                  <a:ext uri="{0D108BD9-81ED-4DB2-BD59-A6C34878D82A}">
+                    <a16:rowId xmlns:a16="http://schemas.microsoft.com/office/drawing/2014/main" val="1956636312"/>
+                  </a:ext>
+                </a:extLst>
+              </a:tr>
+              <a:tr h="370840">
+                <a:tc>
+                  <a:txBody>
+                    <a:bodyPr/>
+                    <a:lstStyle/>
+                    <a:p>
+                      <a:r>
+                        <a:rPr lang="en-US" dirty="0" err="1"/>
+                        <a:t>afterEach</a:t>
+                      </a:r>
+                      <a:r>
+                        <a:rPr lang="en-US" dirty="0"/>
+                        <a:t>()</a:t>
+                      </a:r>
+                    </a:p>
+                  </a:txBody>
+                  <a:tcPr/>
+                </a:tc>
+                <a:tc>
+                  <a:txBody>
+                    <a:bodyPr/>
+                    <a:lstStyle/>
+                    <a:p>
+                      <a:r>
+                        <a:rPr lang="en-US" dirty="0"/>
+                        <a:t>Code that will run after each test case.</a:t>
+                      </a:r>
+                    </a:p>
+                  </a:txBody>
+                  <a:tcPr/>
+                </a:tc>
+                <a:extLst>
+                  <a:ext uri="{0D108BD9-81ED-4DB2-BD59-A6C34878D82A}">
+                    <a16:rowId xmlns:a16="http://schemas.microsoft.com/office/drawing/2014/main" val="622138303"/>
+                  </a:ext>
+                </a:extLst>
+              </a:tr>
+              <a:tr h="370840">
+                <a:tc>
+                  <a:txBody>
+                    <a:bodyPr/>
+                    <a:lstStyle/>
+                    <a:p>
+                      <a:r>
+                        <a:rPr lang="en-US" dirty="0"/>
+                        <a:t>after()</a:t>
+                      </a:r>
+                    </a:p>
+                  </a:txBody>
+                  <a:tcPr/>
+                </a:tc>
+                <a:tc>
+                  <a:txBody>
+                    <a:bodyPr/>
+                    <a:lstStyle/>
+                    <a:p>
+                      <a:pPr marL="0" marR="0" lvl="0" indent="0" algn="l" defTabSz="914400" rtl="0" eaLnBrk="1" fontAlgn="auto" latinLnBrk="0" hangingPunct="1">
+                        <a:lnSpc>
+                          <a:spcPct val="100000"/>
+                        </a:lnSpc>
+                        <a:spcBef>
+                          <a:spcPts val="0"/>
+                        </a:spcBef>
+                        <a:spcAft>
+                          <a:spcPts val="0"/>
+                        </a:spcAft>
+                        <a:buClrTx/>
+                        <a:buSzTx/>
+                        <a:buFontTx/>
+                        <a:buNone/>
+                        <a:tabLst/>
+                        <a:defRPr/>
+                      </a:pPr>
+                      <a:r>
+                        <a:rPr lang="en-US" dirty="0"/>
+                        <a:t>Code that will run once after all test cases have finished.</a:t>
+                      </a:r>
+                    </a:p>
+                  </a:txBody>
+                  <a:tcPr/>
+                </a:tc>
+                <a:extLst>
+                  <a:ext uri="{0D108BD9-81ED-4DB2-BD59-A6C34878D82A}">
+                    <a16:rowId xmlns:a16="http://schemas.microsoft.com/office/drawing/2014/main" val="310534686"/>
+                  </a:ext>
+                </a:extLst>
+              </a:tr>
+            </a:tbl>
+          </a:graphicData>
+        </a:graphic>
+      </p:graphicFrame>
+    </p:spTree>
+    <p:extLst>
+      <p:ext uri="{BB962C8B-B14F-4D97-AF65-F5344CB8AC3E}">
+        <p14:creationId xmlns:p14="http://schemas.microsoft.com/office/powerpoint/2010/main" val="2419190853"/>
+      </p:ext>
+    </p:extLst>
+  </p:cSld>
+  <p:clrMapOvr>
+    <a:masterClrMapping/>
+  </p:clrMapOvr>
+  <p:transition spd="slow">
+    <p:cut/>
+  </p:transition>
+</p:sld>
+</file>
+
+<file path=ppt/slides/slide8.xml><?xml version="1.0" encoding="utf-8"?>
+<p:sld xmlns:a="http://schemas.openxmlformats.org/drawingml/2006/main" xmlns:r="http://schemas.openxmlformats.org/officeDocument/2006/relationships" xmlns:p="http://schemas.openxmlformats.org/presentationml/2006/main">
+  <p:cSld>
+    <p:spTree>
+      <p:nvGrpSpPr>
+        <p:cNvPr id="1" name="Shape 29"/>
+        <p:cNvGrpSpPr/>
+        <p:nvPr/>
+      </p:nvGrpSpPr>
+      <p:grpSpPr>
+        <a:xfrm>
+          <a:off x="0" y="0"/>
+          <a:ext cx="0" cy="0"/>
+          <a:chOff x="0" y="0"/>
+          <a:chExt cx="0" cy="0"/>
+        </a:xfrm>
+      </p:grpSpPr>
+      <p:sp>
+        <p:nvSpPr>
+          <p:cNvPr id="30" name="Shape 30"/>
+          <p:cNvSpPr txBox="1">
+            <a:spLocks noGrp="1"/>
+          </p:cNvSpPr>
+          <p:nvPr>
+            <p:ph type="title"/>
+          </p:nvPr>
+        </p:nvSpPr>
+        <p:spPr>
+          <a:xfrm>
+            <a:off x="457200" y="380331"/>
+            <a:ext cx="8229600" cy="782960"/>
+          </a:xfrm>
+          <a:prstGeom prst="rect">
+            <a:avLst/>
+          </a:prstGeom>
+        </p:spPr>
+        <p:txBody>
+          <a:bodyPr lIns="91425" tIns="91425" rIns="91425" bIns="91425" anchor="b" anchorCtr="0">
+            <a:noAutofit/>
+          </a:bodyPr>
+          <a:lstStyle/>
+          <a:p>
+            <a:r>
+              <a:rPr lang="en-US" sz="3600" dirty="0"/>
+              <a:t>First test</a:t>
+            </a:r>
+            <a:endParaRPr lang="sv" dirty="0"/>
+          </a:p>
+        </p:txBody>
+      </p:sp>
+      <p:sp>
+        <p:nvSpPr>
+          <p:cNvPr id="31" name="Shape 31"/>
+          <p:cNvSpPr txBox="1">
+            <a:spLocks noGrp="1"/>
+          </p:cNvSpPr>
+          <p:nvPr>
+            <p:ph type="body" idx="1"/>
+          </p:nvPr>
+        </p:nvSpPr>
+        <p:spPr>
+          <a:xfrm>
+            <a:off x="457200" y="1290464"/>
+            <a:ext cx="8229600" cy="4277072"/>
+          </a:xfrm>
+          <a:prstGeom prst="rect">
+            <a:avLst/>
+          </a:prstGeom>
+        </p:spPr>
+        <p:txBody>
+          <a:bodyPr lIns="91425" tIns="91425" rIns="91425" bIns="91425" anchor="t" anchorCtr="0">
+            <a:noAutofit/>
+          </a:bodyPr>
+          <a:lstStyle/>
+          <a:p>
+            <a:r>
+              <a:rPr lang="en-US" sz="2400" dirty="0"/>
+              <a:t>Cypress can be started from git-bash with any of:</a:t>
+            </a:r>
+          </a:p>
+          <a:p>
+            <a:pPr lvl="1">
+              <a:buFont typeface="Wingdings" panose="05000000000000000000" pitchFamily="2" charset="2"/>
+              <a:buChar char="Ø"/>
+            </a:pPr>
+            <a:r>
+              <a:rPr lang="en-US" sz="1800" dirty="0">
+                <a:solidFill>
+                  <a:prstClr val="black"/>
+                </a:solidFill>
+                <a:latin typeface="Lucida Console" panose="020B0609040504020204" pitchFamily="49" charset="0"/>
+              </a:rPr>
+              <a:t>./</a:t>
+            </a:r>
+            <a:r>
+              <a:rPr lang="en-US" sz="1800" dirty="0" err="1">
+                <a:solidFill>
+                  <a:prstClr val="black"/>
+                </a:solidFill>
+                <a:latin typeface="Lucida Console" panose="020B0609040504020204" pitchFamily="49" charset="0"/>
+              </a:rPr>
+              <a:t>node_modules</a:t>
+            </a:r>
+            <a:r>
+              <a:rPr lang="en-US" sz="1800" dirty="0">
+                <a:solidFill>
+                  <a:prstClr val="black"/>
+                </a:solidFill>
+                <a:latin typeface="Lucida Console" panose="020B0609040504020204" pitchFamily="49" charset="0"/>
+              </a:rPr>
+              <a:t>/.bin/cypress open</a:t>
+            </a:r>
+          </a:p>
+          <a:p>
+            <a:pPr lvl="1">
+              <a:buFont typeface="Wingdings" panose="05000000000000000000" pitchFamily="2" charset="2"/>
+              <a:buChar char="Ø"/>
+            </a:pPr>
+            <a:r>
+              <a:rPr lang="en-US" sz="1800" dirty="0" err="1">
+                <a:solidFill>
+                  <a:prstClr val="black"/>
+                </a:solidFill>
+                <a:latin typeface="Lucida Console" panose="020B0609040504020204" pitchFamily="49" charset="0"/>
+              </a:rPr>
+              <a:t>npx</a:t>
+            </a:r>
+            <a:r>
+              <a:rPr lang="en-US" sz="1800" dirty="0">
+                <a:solidFill>
+                  <a:prstClr val="black"/>
+                </a:solidFill>
+                <a:latin typeface="Lucida Console" panose="020B0609040504020204" pitchFamily="49" charset="0"/>
+              </a:rPr>
+              <a:t> cypress open</a:t>
+            </a:r>
+          </a:p>
+          <a:p>
+            <a:pPr lvl="1">
+              <a:buFont typeface="Wingdings" panose="05000000000000000000" pitchFamily="2" charset="2"/>
+              <a:buChar char="Ø"/>
+            </a:pPr>
+            <a:r>
+              <a:rPr lang="en-US" sz="1800" dirty="0" err="1">
+                <a:solidFill>
+                  <a:prstClr val="black"/>
+                </a:solidFill>
+                <a:latin typeface="Lucida Console" panose="020B0609040504020204" pitchFamily="49" charset="0"/>
+              </a:rPr>
+              <a:t>npm</a:t>
+            </a:r>
+            <a:r>
+              <a:rPr lang="en-US" sz="1800" dirty="0">
+                <a:solidFill>
+                  <a:prstClr val="black"/>
+                </a:solidFill>
+                <a:latin typeface="Lucida Console" panose="020B0609040504020204" pitchFamily="49" charset="0"/>
+              </a:rPr>
+              <a:t> run </a:t>
+            </a:r>
+            <a:r>
+              <a:rPr lang="en-US" sz="1800" dirty="0" err="1">
+                <a:solidFill>
+                  <a:prstClr val="black"/>
+                </a:solidFill>
+                <a:latin typeface="Lucida Console" panose="020B0609040504020204" pitchFamily="49" charset="0"/>
+              </a:rPr>
+              <a:t>cyo</a:t>
+            </a:r>
+            <a:endParaRPr lang="sv" sz="2300" dirty="0">
+              <a:solidFill>
+                <a:srgbClr val="000000"/>
+              </a:solidFill>
+            </a:endParaRPr>
+          </a:p>
+        </p:txBody>
+      </p:sp>
+    </p:spTree>
+    <p:extLst>
+      <p:ext uri="{BB962C8B-B14F-4D97-AF65-F5344CB8AC3E}">
+        <p14:creationId xmlns:p14="http://schemas.microsoft.com/office/powerpoint/2010/main" val="3893650033"/>
       </p:ext>
     </p:extLst>
   </p:cSld>

</xml_diff>

<commit_message>
more pp + ignoring sample file in gitignore
</commit_message>
<xml_diff>
--- a/workshop/CypressWS.pptx
+++ b/workshop/CypressWS.pptx
@@ -216,7 +216,7 @@
             <a:fld id="{4B692815-F29B-470E-933C-C013C16C0B4A}" type="datetimeFigureOut">
               <a:rPr lang="sv-SE" smtClean="0"/>
               <a:pPr/>
-              <a:t>2021-09-16</a:t>
+              <a:t>2021-09-17</a:t>
             </a:fld>
             <a:endParaRPr lang="sv-SE"/>
           </a:p>
@@ -1451,7 +1451,7 @@
               <a:defRPr/>
             </a:pPr>
             <a:r>
-              <a:rPr lang="en-US" noProof="0"/>
+              <a:rPr lang="en-US" noProof="0" dirty="0"/>
               <a:t>Start cypress and run the example</a:t>
             </a:r>
           </a:p>
@@ -1460,6 +1460,44 @@
               <a:buFontTx/>
               <a:buChar char="-"/>
             </a:pPr>
+            <a:r>
+              <a:rPr lang="en-US" noProof="0" dirty="0"/>
+              <a:t>I will make it simple for me and use Cypress own tutorial for writing your first test</a:t>
+            </a:r>
+          </a:p>
+          <a:p>
+            <a:pPr marL="171450" indent="-171450">
+              <a:buFontTx/>
+              <a:buChar char="-"/>
+            </a:pPr>
+            <a:r>
+              <a:rPr lang="en-US" noProof="0" dirty="0"/>
+              <a:t>If it’s the first time you started cypress you will get a link to the first test tutorial</a:t>
+            </a:r>
+          </a:p>
+          <a:p>
+            <a:pPr marL="171450" indent="-171450">
+              <a:buFontTx/>
+              <a:buChar char="-"/>
+            </a:pPr>
+            <a:r>
+              <a:rPr lang="en-US" noProof="0" dirty="0"/>
+              <a:t>Check that all have Cypress started and first test up</a:t>
+            </a:r>
+          </a:p>
+          <a:p>
+            <a:pPr marL="171450" indent="-171450">
+              <a:buFontTx/>
+              <a:buChar char="-"/>
+            </a:pPr>
+            <a:r>
+              <a:rPr lang="en-US" noProof="0" dirty="0"/>
+              <a:t>Ask as soon as anything seems unclear, going thru first test </a:t>
+            </a:r>
+            <a:r>
+              <a:rPr lang="en-US" noProof="0"/>
+              <a:t>will take about 30 min</a:t>
+            </a:r>
             <a:endParaRPr lang="en-US" noProof="0" dirty="0"/>
           </a:p>
         </p:txBody>
@@ -8433,11 +8471,27 @@
               </a:rPr>
               <a:t>cyo</a:t>
             </a:r>
-            <a:endParaRPr lang="sv" sz="2300" dirty="0">
+            <a:endParaRPr lang="en-US" sz="1800" dirty="0">
               <a:solidFill>
-                <a:srgbClr val="000000"/>
+                <a:prstClr val="black"/>
               </a:solidFill>
+              <a:latin typeface="Lucida Console" panose="020B0609040504020204" pitchFamily="49" charset="0"/>
             </a:endParaRPr>
+          </a:p>
+          <a:p>
+            <a:r>
+              <a:rPr lang="en-US" sz="2400" dirty="0" err="1"/>
+              <a:t>Goto</a:t>
+            </a:r>
+            <a:r>
+              <a:rPr lang="en-US" sz="2400" dirty="0"/>
+              <a:t> </a:t>
+            </a:r>
+            <a:r>
+              <a:rPr lang="en-US" sz="1800" dirty="0"/>
+              <a:t>https://docs.cypress.io/guides/getting-started/writing-your-first-test</a:t>
+            </a:r>
+            <a:endParaRPr lang="sv" sz="1800" dirty="0"/>
           </a:p>
         </p:txBody>
       </p:sp>

</xml_diff>

<commit_message>
ongoing changes to MD:s and PP
</commit_message>
<xml_diff>
--- a/workshop/CypressWS.pptx
+++ b/workshop/CypressWS.pptx
@@ -1433,6 +1433,81 @@
             <a:endParaRPr lang="en-US" noProof="0" dirty="0"/>
           </a:p>
           <a:p>
+            <a:pPr marL="628650" lvl="1" indent="-171450">
+              <a:buFontTx/>
+              <a:buChar char="-"/>
+            </a:pPr>
+            <a:r>
+              <a:rPr lang="en-US" noProof="0" dirty="0"/>
+              <a:t>1. Here we run the Cypress application directly by giving the relative path to it (from our </a:t>
+            </a:r>
+            <a:r>
+              <a:rPr lang="en-US" noProof="0" dirty="0" err="1"/>
+              <a:t>ws</a:t>
+            </a:r>
+            <a:r>
+              <a:rPr lang="en-US" noProof="0" dirty="0"/>
+              <a:t> folder)</a:t>
+            </a:r>
+          </a:p>
+          <a:p>
+            <a:pPr marL="628650" lvl="1" indent="-171450">
+              <a:buFontTx/>
+              <a:buChar char="-"/>
+            </a:pPr>
+            <a:r>
+              <a:rPr lang="en-US" noProof="0" dirty="0"/>
+              <a:t>2. In later versions of </a:t>
+            </a:r>
+            <a:r>
+              <a:rPr lang="en-US" noProof="0" dirty="0" err="1"/>
+              <a:t>npm</a:t>
+            </a:r>
+            <a:r>
+              <a:rPr lang="en-US" noProof="0" dirty="0"/>
+              <a:t> we can use </a:t>
+            </a:r>
+            <a:r>
+              <a:rPr lang="en-US" noProof="0" dirty="0" err="1"/>
+              <a:t>npx</a:t>
+            </a:r>
+            <a:r>
+              <a:rPr lang="en-US" noProof="0" dirty="0"/>
+              <a:t>, </a:t>
+            </a:r>
+            <a:r>
+              <a:rPr lang="en-US" noProof="0" dirty="0" err="1"/>
+              <a:t>npx</a:t>
+            </a:r>
+            <a:r>
+              <a:rPr lang="en-US" noProof="0" dirty="0"/>
+              <a:t> will automatically find our application</a:t>
+            </a:r>
+          </a:p>
+          <a:p>
+            <a:pPr marL="628650" lvl="1" indent="-171450">
+              <a:buFontTx/>
+              <a:buChar char="-"/>
+            </a:pPr>
+            <a:r>
+              <a:rPr lang="en-US" noProof="0" dirty="0"/>
+              <a:t>3. We can also define our own commands in the </a:t>
+            </a:r>
+            <a:r>
+              <a:rPr lang="en-US" noProof="0" dirty="0" err="1"/>
+              <a:t>package.json</a:t>
+            </a:r>
+            <a:r>
+              <a:rPr lang="en-US" noProof="0" dirty="0"/>
+              <a:t> file – show </a:t>
+            </a:r>
+            <a:r>
+              <a:rPr lang="en-US" noProof="0" dirty="0" err="1"/>
+              <a:t>package.json</a:t>
+            </a:r>
+            <a:endParaRPr lang="en-US" noProof="0" dirty="0"/>
+          </a:p>
+          <a:p>
             <a:pPr marL="171450" marR="0" lvl="0" indent="-171450" algn="l" defTabSz="914400" rtl="0" eaLnBrk="1" fontAlgn="auto" latinLnBrk="0" hangingPunct="1">
               <a:lnSpc>
                 <a:spcPct val="100000"/>
@@ -1492,13 +1567,8 @@
             </a:pPr>
             <a:r>
               <a:rPr lang="en-US" noProof="0" dirty="0"/>
-              <a:t>Ask as soon as anything seems unclear, going thru first test </a:t>
-            </a:r>
-            <a:r>
-              <a:rPr lang="en-US" noProof="0"/>
-              <a:t>will take about 30 min</a:t>
-            </a:r>
-            <a:endParaRPr lang="en-US" noProof="0" dirty="0"/>
+              <a:t>Ask as soon as anything seems unclear, going thru first test will take about 30 min</a:t>
+            </a:r>
           </a:p>
         </p:txBody>
       </p:sp>

</xml_diff>

<commit_message>
Continuos PP updates, added Solutions folder
</commit_message>
<xml_diff>
--- a/workshop/CypressWS.pptx
+++ b/workshop/CypressWS.pptx
@@ -5,7 +5,7 @@
     <p:sldMasterId id="2147483648" r:id="rId1"/>
   </p:sldMasterIdLst>
   <p:notesMasterIdLst>
-    <p:notesMasterId r:id="rId10"/>
+    <p:notesMasterId r:id="rId11"/>
   </p:notesMasterIdLst>
   <p:sldIdLst>
     <p:sldId id="256" r:id="rId2"/>
@@ -16,6 +16,7 @@
     <p:sldId id="370" r:id="rId7"/>
     <p:sldId id="371" r:id="rId8"/>
     <p:sldId id="372" r:id="rId9"/>
+    <p:sldId id="373" r:id="rId10"/>
   </p:sldIdLst>
   <p:sldSz cx="9144000" cy="6858000" type="screen4x3"/>
   <p:notesSz cx="6797675" cy="9926638"/>
@@ -216,7 +217,7 @@
             <a:fld id="{4B692815-F29B-470E-933C-C013C16C0B4A}" type="datetimeFigureOut">
               <a:rPr lang="sv-SE" smtClean="0"/>
               <a:pPr/>
-              <a:t>2021-09-29</a:t>
+              <a:t>2021-09-30</a:t>
             </a:fld>
             <a:endParaRPr lang="sv-SE"/>
           </a:p>
@@ -1527,8 +1528,41 @@
             </a:pPr>
             <a:r>
               <a:rPr lang="en-US" noProof="0" dirty="0"/>
-              <a:t>Start cypress and run the example</a:t>
-            </a:r>
+              <a:t>I will now start cypress and run the 1:st example:: I will now just show what it looks like when you run a test in Cypress </a:t>
+            </a:r>
+            <a:r>
+              <a:rPr lang="en-US" noProof="0" dirty="0" err="1"/>
+              <a:t>testrunner</a:t>
+            </a:r>
+            <a:endParaRPr lang="en-US" noProof="0" dirty="0"/>
+          </a:p>
+          <a:p>
+            <a:pPr marL="628650" marR="0" lvl="1" indent="-171450" algn="l" defTabSz="914400" rtl="0" eaLnBrk="1" fontAlgn="auto" latinLnBrk="0" hangingPunct="1">
+              <a:lnSpc>
+                <a:spcPct val="100000"/>
+              </a:lnSpc>
+              <a:spcBef>
+                <a:spcPts val="0"/>
+              </a:spcBef>
+              <a:spcAft>
+                <a:spcPts val="0"/>
+              </a:spcAft>
+              <a:buClrTx/>
+              <a:buSzTx/>
+              <a:buFontTx/>
+              <a:buChar char="-"/>
+              <a:tabLst/>
+              <a:defRPr/>
+            </a:pPr>
+            <a:r>
+              <a:rPr lang="en-US" noProof="0" dirty="0"/>
+              <a:t>Show how to expand the finished test in the </a:t>
+            </a:r>
+            <a:r>
+              <a:rPr lang="en-US" noProof="0" dirty="0" err="1"/>
+              <a:t>testrunner</a:t>
+            </a:r>
+            <a:endParaRPr lang="en-US" noProof="0" dirty="0"/>
           </a:p>
           <a:p>
             <a:pPr marL="171450" indent="-171450">
@@ -1547,7 +1581,7 @@
             </a:pPr>
             <a:r>
               <a:rPr lang="en-US" noProof="0" dirty="0"/>
-              <a:t>If it’s the first time you started cypress you will get a link to the first test tutorial</a:t>
+              <a:t>Now everybody can start Cypress, if you haven’t already. If it’s the first time you started cypress you will get a link to the first test tutorial</a:t>
             </a:r>
           </a:p>
           <a:p>
@@ -1557,7 +1591,7 @@
             </a:pPr>
             <a:r>
               <a:rPr lang="en-US" noProof="0" dirty="0"/>
-              <a:t>Check that all have Cypress started and first test up</a:t>
+              <a:t>Has everybody got Cypress started?  </a:t>
             </a:r>
           </a:p>
           <a:p>
@@ -1567,7 +1601,17 @@
             </a:pPr>
             <a:r>
               <a:rPr lang="en-US" noProof="0" dirty="0"/>
-              <a:t>Ask as soon as anything seems unclear, going thru first test will take about 30 min</a:t>
+              <a:t>Then go a head and run thru the tutorial for writing your first test, this will take about 30 min</a:t>
+            </a:r>
+          </a:p>
+          <a:p>
+            <a:pPr marL="171450" indent="-171450">
+              <a:buFontTx/>
+              <a:buChar char="-"/>
+            </a:pPr>
+            <a:r>
+              <a:rPr lang="en-US" noProof="0" dirty="0"/>
+              <a:t>Ask as soon as anything seems unclear.</a:t>
             </a:r>
           </a:p>
         </p:txBody>
@@ -1576,6 +1620,299 @@
     <p:extLst>
       <p:ext uri="{BB962C8B-B14F-4D97-AF65-F5344CB8AC3E}">
         <p14:creationId xmlns:p14="http://schemas.microsoft.com/office/powerpoint/2010/main" val="1037409139"/>
+      </p:ext>
+    </p:extLst>
+  </p:cSld>
+  <p:clrMapOvr>
+    <a:masterClrMapping/>
+  </p:clrMapOvr>
+</p:notes>
+</file>
+
+<file path=ppt/notesSlides/notesSlide8.xml><?xml version="1.0" encoding="utf-8"?>
+<p:notes xmlns:a="http://schemas.openxmlformats.org/drawingml/2006/main" xmlns:r="http://schemas.openxmlformats.org/officeDocument/2006/relationships" xmlns:p="http://schemas.openxmlformats.org/presentationml/2006/main" showMasterSp="0" showMasterPhAnim="0">
+  <p:cSld>
+    <p:spTree>
+      <p:nvGrpSpPr>
+        <p:cNvPr id="1" name="Shape 33"/>
+        <p:cNvGrpSpPr/>
+        <p:nvPr/>
+      </p:nvGrpSpPr>
+      <p:grpSpPr>
+        <a:xfrm>
+          <a:off x="0" y="0"/>
+          <a:ext cx="0" cy="0"/>
+          <a:chOff x="0" y="0"/>
+          <a:chExt cx="0" cy="0"/>
+        </a:xfrm>
+      </p:grpSpPr>
+      <p:sp>
+        <p:nvSpPr>
+          <p:cNvPr id="34" name="Shape 34"/>
+          <p:cNvSpPr>
+            <a:spLocks noGrp="1" noRot="1" noChangeAspect="1"/>
+          </p:cNvSpPr>
+          <p:nvPr>
+            <p:ph type="sldImg" idx="2"/>
+          </p:nvPr>
+        </p:nvSpPr>
+        <p:spPr>
+          <a:xfrm>
+            <a:off x="919163" y="744538"/>
+            <a:ext cx="4960937" cy="3722687"/>
+          </a:xfrm>
+          <a:custGeom>
+            <a:avLst/>
+            <a:gdLst/>
+            <a:ahLst/>
+            <a:cxnLst/>
+            <a:rect l="0" t="0" r="0" b="0"/>
+            <a:pathLst>
+              <a:path w="120000" h="120000" extrusionOk="0">
+                <a:moveTo>
+                  <a:pt x="0" y="0"/>
+                </a:moveTo>
+                <a:lnTo>
+                  <a:pt x="120000" y="0"/>
+                </a:lnTo>
+                <a:lnTo>
+                  <a:pt x="120000" y="120000"/>
+                </a:lnTo>
+                <a:lnTo>
+                  <a:pt x="0" y="120000"/>
+                </a:lnTo>
+                <a:close/>
+              </a:path>
+            </a:pathLst>
+          </a:custGeom>
+        </p:spPr>
+      </p:sp>
+      <p:sp>
+        <p:nvSpPr>
+          <p:cNvPr id="35" name="Shape 35"/>
+          <p:cNvSpPr txBox="1">
+            <a:spLocks noGrp="1"/>
+          </p:cNvSpPr>
+          <p:nvPr>
+            <p:ph type="body" idx="1"/>
+          </p:nvPr>
+        </p:nvSpPr>
+        <p:spPr>
+          <a:xfrm>
+            <a:off x="679768" y="4715153"/>
+            <a:ext cx="5438139" cy="4466987"/>
+          </a:xfrm>
+          <a:prstGeom prst="rect">
+            <a:avLst/>
+          </a:prstGeom>
+        </p:spPr>
+        <p:txBody>
+          <a:bodyPr lIns="91425" tIns="91425" rIns="91425" bIns="91425" anchor="t" anchorCtr="0">
+            <a:noAutofit/>
+          </a:bodyPr>
+          <a:lstStyle/>
+          <a:p>
+            <a:pPr marL="171450" indent="-171450">
+              <a:buFontTx/>
+              <a:buChar char="-"/>
+            </a:pPr>
+            <a:r>
+              <a:rPr lang="en-US" noProof="0" dirty="0"/>
+              <a:t>Explain the 3 </a:t>
+            </a:r>
+            <a:r>
+              <a:rPr lang="en-US" noProof="0" dirty="0" err="1"/>
+              <a:t>cmd’s</a:t>
+            </a:r>
+            <a:endParaRPr lang="en-US" noProof="0" dirty="0"/>
+          </a:p>
+          <a:p>
+            <a:pPr marL="628650" lvl="1" indent="-171450">
+              <a:buFontTx/>
+              <a:buChar char="-"/>
+            </a:pPr>
+            <a:r>
+              <a:rPr lang="en-US" noProof="0" dirty="0"/>
+              <a:t>1. Here we run the Cypress application directly by giving the relative path to it (from our </a:t>
+            </a:r>
+            <a:r>
+              <a:rPr lang="en-US" noProof="0" dirty="0" err="1"/>
+              <a:t>ws</a:t>
+            </a:r>
+            <a:r>
+              <a:rPr lang="en-US" noProof="0" dirty="0"/>
+              <a:t> folder)</a:t>
+            </a:r>
+          </a:p>
+          <a:p>
+            <a:pPr marL="628650" lvl="1" indent="-171450">
+              <a:buFontTx/>
+              <a:buChar char="-"/>
+            </a:pPr>
+            <a:r>
+              <a:rPr lang="en-US" noProof="0" dirty="0"/>
+              <a:t>2. In later versions of </a:t>
+            </a:r>
+            <a:r>
+              <a:rPr lang="en-US" noProof="0" dirty="0" err="1"/>
+              <a:t>npm</a:t>
+            </a:r>
+            <a:r>
+              <a:rPr lang="en-US" noProof="0" dirty="0"/>
+              <a:t> we can use </a:t>
+            </a:r>
+            <a:r>
+              <a:rPr lang="en-US" noProof="0" dirty="0" err="1"/>
+              <a:t>npx</a:t>
+            </a:r>
+            <a:r>
+              <a:rPr lang="en-US" noProof="0" dirty="0"/>
+              <a:t>, </a:t>
+            </a:r>
+            <a:r>
+              <a:rPr lang="en-US" noProof="0" dirty="0" err="1"/>
+              <a:t>npx</a:t>
+            </a:r>
+            <a:r>
+              <a:rPr lang="en-US" noProof="0" dirty="0"/>
+              <a:t> will automatically find our application</a:t>
+            </a:r>
+          </a:p>
+          <a:p>
+            <a:pPr marL="628650" lvl="1" indent="-171450">
+              <a:buFontTx/>
+              <a:buChar char="-"/>
+            </a:pPr>
+            <a:r>
+              <a:rPr lang="en-US" noProof="0" dirty="0"/>
+              <a:t>3. We can also define our own commands in the </a:t>
+            </a:r>
+            <a:r>
+              <a:rPr lang="en-US" noProof="0" dirty="0" err="1"/>
+              <a:t>package.json</a:t>
+            </a:r>
+            <a:r>
+              <a:rPr lang="en-US" noProof="0" dirty="0"/>
+              <a:t> file – show </a:t>
+            </a:r>
+            <a:r>
+              <a:rPr lang="en-US" noProof="0" dirty="0" err="1"/>
+              <a:t>package.json</a:t>
+            </a:r>
+            <a:endParaRPr lang="en-US" noProof="0" dirty="0"/>
+          </a:p>
+          <a:p>
+            <a:pPr marL="171450" marR="0" lvl="0" indent="-171450" algn="l" defTabSz="914400" rtl="0" eaLnBrk="1" fontAlgn="auto" latinLnBrk="0" hangingPunct="1">
+              <a:lnSpc>
+                <a:spcPct val="100000"/>
+              </a:lnSpc>
+              <a:spcBef>
+                <a:spcPts val="0"/>
+              </a:spcBef>
+              <a:spcAft>
+                <a:spcPts val="0"/>
+              </a:spcAft>
+              <a:buClrTx/>
+              <a:buSzTx/>
+              <a:buFontTx/>
+              <a:buChar char="-"/>
+              <a:tabLst/>
+              <a:defRPr/>
+            </a:pPr>
+            <a:r>
+              <a:rPr lang="en-US" noProof="0" dirty="0"/>
+              <a:t>I will now start cypress and run the 1:st example:: I will now just show what it looks like when you run a test in Cypress </a:t>
+            </a:r>
+            <a:r>
+              <a:rPr lang="en-US" noProof="0" dirty="0" err="1"/>
+              <a:t>testrunner</a:t>
+            </a:r>
+            <a:endParaRPr lang="en-US" noProof="0" dirty="0"/>
+          </a:p>
+          <a:p>
+            <a:pPr marL="628650" marR="0" lvl="1" indent="-171450" algn="l" defTabSz="914400" rtl="0" eaLnBrk="1" fontAlgn="auto" latinLnBrk="0" hangingPunct="1">
+              <a:lnSpc>
+                <a:spcPct val="100000"/>
+              </a:lnSpc>
+              <a:spcBef>
+                <a:spcPts val="0"/>
+              </a:spcBef>
+              <a:spcAft>
+                <a:spcPts val="0"/>
+              </a:spcAft>
+              <a:buClrTx/>
+              <a:buSzTx/>
+              <a:buFontTx/>
+              <a:buChar char="-"/>
+              <a:tabLst/>
+              <a:defRPr/>
+            </a:pPr>
+            <a:r>
+              <a:rPr lang="en-US" noProof="0" dirty="0"/>
+              <a:t>Show how to expand the finished test in the </a:t>
+            </a:r>
+            <a:r>
+              <a:rPr lang="en-US" noProof="0" dirty="0" err="1"/>
+              <a:t>testrunner</a:t>
+            </a:r>
+            <a:endParaRPr lang="en-US" noProof="0" dirty="0"/>
+          </a:p>
+          <a:p>
+            <a:pPr marL="171450" indent="-171450">
+              <a:buFontTx/>
+              <a:buChar char="-"/>
+            </a:pPr>
+            <a:r>
+              <a:rPr lang="en-US" noProof="0" dirty="0"/>
+              <a:t>I will make it simple for me and use Cypress own tutorial for writing your first test</a:t>
+            </a:r>
+          </a:p>
+          <a:p>
+            <a:pPr marL="171450" indent="-171450">
+              <a:buFontTx/>
+              <a:buChar char="-"/>
+            </a:pPr>
+            <a:r>
+              <a:rPr lang="en-US" noProof="0" dirty="0"/>
+              <a:t>Now everybody can start Cypress, if you haven’t already. If it’s the first time you started cypress you will get a link to the first test tutorial</a:t>
+            </a:r>
+          </a:p>
+          <a:p>
+            <a:pPr marL="171450" indent="-171450">
+              <a:buFontTx/>
+              <a:buChar char="-"/>
+            </a:pPr>
+            <a:r>
+              <a:rPr lang="en-US" noProof="0" dirty="0"/>
+              <a:t>Has everybody got Cypress started?  </a:t>
+            </a:r>
+          </a:p>
+          <a:p>
+            <a:pPr marL="171450" indent="-171450">
+              <a:buFontTx/>
+              <a:buChar char="-"/>
+            </a:pPr>
+            <a:r>
+              <a:rPr lang="en-US" noProof="0" dirty="0"/>
+              <a:t>Then go a head and run thru the tutorial for writing your first test, this will take about 30 min</a:t>
+            </a:r>
+          </a:p>
+          <a:p>
+            <a:pPr marL="171450" indent="-171450">
+              <a:buFontTx/>
+              <a:buChar char="-"/>
+            </a:pPr>
+            <a:r>
+              <a:rPr lang="en-US" noProof="0" dirty="0"/>
+              <a:t>Ask as soon as anything seems unclear.</a:t>
+            </a:r>
+          </a:p>
+        </p:txBody>
+      </p:sp>
+    </p:spTree>
+    <p:extLst>
+      <p:ext uri="{BB962C8B-B14F-4D97-AF65-F5344CB8AC3E}">
+        <p14:creationId xmlns:p14="http://schemas.microsoft.com/office/powerpoint/2010/main" val="633826476"/>
       </p:ext>
     </p:extLst>
   </p:cSld>
@@ -8550,10 +8887,33 @@
               <a:t> </a:t>
             </a:r>
             <a:r>
-              <a:rPr lang="en-US" sz="1800" dirty="0"/>
+              <a:rPr lang="en-US" sz="1800" dirty="0">
+                <a:hlinkClick r:id="rId3"/>
+              </a:rPr>
               <a:t>https://docs.cypress.io/guides/getting-started/writing-your-first-test</a:t>
             </a:r>
-            <a:endParaRPr lang="sv" sz="1800" dirty="0"/>
+            <a:endParaRPr lang="en-US" sz="1800" dirty="0"/>
+          </a:p>
+          <a:p>
+            <a:pPr lvl="1">
+              <a:buFont typeface="Wingdings" panose="05000000000000000000" pitchFamily="2" charset="2"/>
+              <a:buChar char="Ø"/>
+            </a:pPr>
+            <a:r>
+              <a:rPr lang="en-US" sz="1700" dirty="0"/>
+              <a:t>Remember to open two git-bash, cypress app will lock one git-bash</a:t>
+            </a:r>
+          </a:p>
+          <a:p>
+            <a:pPr lvl="1">
+              <a:buFont typeface="Wingdings" panose="05000000000000000000" pitchFamily="2" charset="2"/>
+              <a:buChar char="Ø"/>
+            </a:pPr>
+            <a:r>
+              <a:rPr lang="en-US" sz="1700" dirty="0"/>
+              <a:t>Stop when you get to headline “Next Steps”</a:t>
+            </a:r>
+            <a:endParaRPr lang="sv" sz="1700" dirty="0"/>
           </a:p>
         </p:txBody>
       </p:sp>
@@ -8561,6 +8921,169 @@
     <p:extLst>
       <p:ext uri="{BB962C8B-B14F-4D97-AF65-F5344CB8AC3E}">
         <p14:creationId xmlns:p14="http://schemas.microsoft.com/office/powerpoint/2010/main" val="3893650033"/>
+      </p:ext>
+    </p:extLst>
+  </p:cSld>
+  <p:clrMapOvr>
+    <a:masterClrMapping/>
+  </p:clrMapOvr>
+  <p:transition spd="slow">
+    <p:cut/>
+  </p:transition>
+</p:sld>
+</file>
+
+<file path=ppt/slides/slide9.xml><?xml version="1.0" encoding="utf-8"?>
+<p:sld xmlns:a="http://schemas.openxmlformats.org/drawingml/2006/main" xmlns:r="http://schemas.openxmlformats.org/officeDocument/2006/relationships" xmlns:p="http://schemas.openxmlformats.org/presentationml/2006/main">
+  <p:cSld>
+    <p:spTree>
+      <p:nvGrpSpPr>
+        <p:cNvPr id="1" name="Shape 29"/>
+        <p:cNvGrpSpPr/>
+        <p:nvPr/>
+      </p:nvGrpSpPr>
+      <p:grpSpPr>
+        <a:xfrm>
+          <a:off x="0" y="0"/>
+          <a:ext cx="0" cy="0"/>
+          <a:chOff x="0" y="0"/>
+          <a:chExt cx="0" cy="0"/>
+        </a:xfrm>
+      </p:grpSpPr>
+      <p:sp>
+        <p:nvSpPr>
+          <p:cNvPr id="30" name="Shape 30"/>
+          <p:cNvSpPr txBox="1">
+            <a:spLocks noGrp="1"/>
+          </p:cNvSpPr>
+          <p:nvPr>
+            <p:ph type="title"/>
+          </p:nvPr>
+        </p:nvSpPr>
+        <p:spPr>
+          <a:xfrm>
+            <a:off x="457200" y="380331"/>
+            <a:ext cx="8229600" cy="782960"/>
+          </a:xfrm>
+          <a:prstGeom prst="rect">
+            <a:avLst/>
+          </a:prstGeom>
+        </p:spPr>
+        <p:txBody>
+          <a:bodyPr lIns="91425" tIns="91425" rIns="91425" bIns="91425" anchor="b" anchorCtr="0">
+            <a:noAutofit/>
+          </a:bodyPr>
+          <a:lstStyle/>
+          <a:p>
+            <a:r>
+              <a:rPr lang="en-US" sz="3600" dirty="0"/>
+              <a:t>WS Exercise 1</a:t>
+            </a:r>
+            <a:endParaRPr lang="sv" dirty="0"/>
+          </a:p>
+        </p:txBody>
+      </p:sp>
+      <p:sp>
+        <p:nvSpPr>
+          <p:cNvPr id="31" name="Shape 31"/>
+          <p:cNvSpPr txBox="1">
+            <a:spLocks noGrp="1"/>
+          </p:cNvSpPr>
+          <p:nvPr>
+            <p:ph type="body" idx="1"/>
+          </p:nvPr>
+        </p:nvSpPr>
+        <p:spPr>
+          <a:xfrm>
+            <a:off x="457200" y="1290464"/>
+            <a:ext cx="8229600" cy="4277072"/>
+          </a:xfrm>
+          <a:prstGeom prst="rect">
+            <a:avLst/>
+          </a:prstGeom>
+        </p:spPr>
+        <p:txBody>
+          <a:bodyPr lIns="91425" tIns="91425" rIns="91425" bIns="91425" anchor="t" anchorCtr="0">
+            <a:noAutofit/>
+          </a:bodyPr>
+          <a:lstStyle/>
+          <a:p>
+            <a:r>
+              <a:rPr lang="en-US" sz="2400" dirty="0"/>
+              <a:t>Create folder ‘Exercises’ in /cypress/integration/</a:t>
+            </a:r>
+          </a:p>
+          <a:p>
+            <a:r>
+              <a:rPr lang="en-US" sz="2400" dirty="0"/>
+              <a:t>In that folder create test specification ex1_spec.js</a:t>
+            </a:r>
+          </a:p>
+          <a:p>
+            <a:r>
+              <a:rPr lang="en-US" sz="2400" dirty="0"/>
+              <a:t>The test should check that David Caro is </a:t>
+            </a:r>
+            <a:r>
+              <a:rPr lang="en-US" sz="2400"/>
+              <a:t>the </a:t>
+            </a:r>
+            <a:r>
+              <a:rPr lang="en-US" sz="2400" dirty="0"/>
+              <a:t>c</a:t>
+            </a:r>
+            <a:r>
+              <a:rPr lang="en-US" sz="2400"/>
+              <a:t>ontact </a:t>
+            </a:r>
+            <a:r>
+              <a:rPr lang="en-US" sz="2400" dirty="0"/>
+              <a:t>person for test automation at CAG</a:t>
+            </a:r>
+          </a:p>
+          <a:p>
+            <a:pPr lvl="1"/>
+            <a:r>
+              <a:rPr lang="en-US" sz="2000" dirty="0"/>
+              <a:t>Cag is found at url: </a:t>
+            </a:r>
+            <a:r>
+              <a:rPr lang="en-US" sz="2000" dirty="0">
+                <a:hlinkClick r:id="rId3"/>
+              </a:rPr>
+              <a:t>https://www.cag.se/</a:t>
+            </a:r>
+            <a:endParaRPr lang="en-US" sz="2000" dirty="0"/>
+          </a:p>
+          <a:p>
+            <a:pPr lvl="1"/>
+            <a:r>
+              <a:rPr lang="en-US" sz="2000" dirty="0"/>
+              <a:t>One way of finding David is:</a:t>
+            </a:r>
+            <a:br>
+              <a:rPr lang="en-US" sz="2000" dirty="0"/>
+            </a:br>
+            <a:r>
+              <a:rPr lang="en-US" sz="2000" dirty="0"/>
+              <a:t>Homepage -&gt; </a:t>
+            </a:r>
+            <a:r>
+              <a:rPr lang="en-US" sz="2000" dirty="0" err="1"/>
+              <a:t>Systemutveckling</a:t>
+            </a:r>
+            <a:r>
+              <a:rPr lang="en-US" sz="2000" dirty="0"/>
+              <a:t> -&gt; Mer om Test</a:t>
+            </a:r>
+            <a:endParaRPr lang="sv" sz="2000" dirty="0"/>
+          </a:p>
+        </p:txBody>
+      </p:sp>
+    </p:spTree>
+    <p:extLst>
+      <p:ext uri="{BB962C8B-B14F-4D97-AF65-F5344CB8AC3E}">
+        <p14:creationId xmlns:p14="http://schemas.microsoft.com/office/powerpoint/2010/main" val="308154394"/>
       </p:ext>
     </p:extLst>
   </p:cSld>

</xml_diff>

<commit_message>
Continuos updates, PP, ex1, links
</commit_message>
<xml_diff>
--- a/workshop/CypressWS.pptx
+++ b/workshop/CypressWS.pptx
@@ -9022,23 +9022,7 @@
           <a:p>
             <a:r>
               <a:rPr lang="en-US" sz="2400" dirty="0"/>
-              <a:t>The test should check that David Caro is </a:t>
-            </a:r>
-            <a:r>
-              <a:rPr lang="en-US" sz="2400"/>
-              <a:t>the </a:t>
-            </a:r>
-            <a:r>
-              <a:rPr lang="en-US" sz="2400" dirty="0"/>
-              <a:t>c</a:t>
-            </a:r>
-            <a:r>
-              <a:rPr lang="en-US" sz="2400"/>
-              <a:t>ontact </a:t>
-            </a:r>
-            <a:r>
-              <a:rPr lang="en-US" sz="2400" dirty="0"/>
-              <a:t>person for test automation at CAG</a:t>
+              <a:t>The test should check that David Caro is the contact person for test automation at CAG</a:t>
             </a:r>
           </a:p>
           <a:p>
@@ -9075,6 +9059,21 @@
             <a:r>
               <a:rPr lang="en-US" sz="2000" dirty="0"/>
               <a:t> -&gt; Mer om Test</a:t>
+            </a:r>
+          </a:p>
+          <a:p>
+            <a:pPr lvl="1"/>
+            <a:r>
+              <a:rPr lang="en-US" sz="2000" dirty="0"/>
+              <a:t>NB! It’s tricky to check </a:t>
+            </a:r>
+            <a:r>
+              <a:rPr lang="en-US" sz="2000" dirty="0" err="1"/>
+              <a:t>Davids</a:t>
+            </a:r>
+            <a:r>
+              <a:rPr lang="en-US" sz="2000" dirty="0"/>
+              <a:t> name. I will show you how if you get stuck. Clue: Resolve promise first.</a:t>
             </a:r>
             <a:endParaRPr lang="sv" sz="2000" dirty="0"/>
           </a:p>

</xml_diff>